<commit_message>
Added New Image to Plot
</commit_message>
<xml_diff>
--- a/Intro & Verses/Verses.pptx
+++ b/Intro & Verses/Verses.pptx
@@ -3745,8 +3745,8 @@
         </p:nvSpPr>
         <p:spPr bwMode="auto">
           <a:xfrm flipH="0" flipV="0">
-            <a:off x="1108712" y="1021465"/>
-            <a:ext cx="8187453" cy="8321400"/>
+            <a:off x="1108711" y="1021464"/>
+            <a:ext cx="8200052" cy="9235799"/>
           </a:xfrm>
           <a:prstGeom prst="rect">
             <a:avLst/>
@@ -3762,7 +3762,7 @@
               <a:defRPr/>
             </a:pPr>
             <a:r>
-              <a:rPr lang="en-US" sz="4800" b="0" i="0" u="none" strike="noStrike" cap="none" spc="0">
+              <a:rPr lang="en-US" sz="4200" b="0" i="0" u="none" strike="noStrike" cap="none" spc="0">
                 <a:solidFill>
                   <a:schemeClr val="bg1"/>
                 </a:solidFill>
@@ -3770,10 +3770,134 @@
                 <a:ea typeface="Agave"/>
                 <a:cs typeface="Agave"/>
               </a:rPr>
-              <a:t>Thou wilt keep him in perfect peace, </a:t>
-            </a:r>
-            <a:r>
-              <a:rPr lang="en-US" sz="4800" b="1" i="0" u="none" strike="noStrike" cap="none" spc="0">
+              <a:t>Blessed [is] the man that walketh </a:t>
+            </a:r>
+            <a:r>
+              <a:rPr lang="en-US" sz="4200" b="0" i="0" u="none" strike="noStrike" cap="none" spc="0">
+                <a:solidFill>
+                  <a:srgbClr val="FFC000"/>
+                </a:solidFill>
+                <a:latin typeface="Agave"/>
+                <a:ea typeface="Agave"/>
+                <a:cs typeface="Agave"/>
+              </a:rPr>
+              <a:t>not in the counsel of the ungodly</a:t>
+            </a:r>
+            <a:r>
+              <a:rPr lang="en-US" sz="4200" b="0" i="0" u="none" strike="noStrike" cap="none" spc="0">
+                <a:solidFill>
+                  <a:schemeClr val="bg1"/>
+                </a:solidFill>
+                <a:latin typeface="Agave"/>
+                <a:ea typeface="Agave"/>
+                <a:cs typeface="Agave"/>
+              </a:rPr>
+              <a:t>, nor </a:t>
+            </a:r>
+            <a:r>
+              <a:rPr lang="en-US" sz="4200" b="0" i="0" u="none" strike="noStrike" cap="none" spc="0">
+                <a:solidFill>
+                  <a:srgbClr val="FFC000"/>
+                </a:solidFill>
+                <a:latin typeface="Agave"/>
+                <a:ea typeface="Agave"/>
+                <a:cs typeface="Agave"/>
+              </a:rPr>
+              <a:t>standeth in the way of sinners</a:t>
+            </a:r>
+            <a:r>
+              <a:rPr lang="en-US" sz="4200" b="0" i="0" u="none" strike="noStrike" cap="none" spc="0">
+                <a:solidFill>
+                  <a:schemeClr val="bg1"/>
+                </a:solidFill>
+                <a:latin typeface="Agave"/>
+                <a:ea typeface="Agave"/>
+                <a:cs typeface="Agave"/>
+              </a:rPr>
+              <a:t>, nor </a:t>
+            </a:r>
+            <a:r>
+              <a:rPr lang="en-US" sz="4200" b="0" i="0" u="none" strike="noStrike" cap="none" spc="0">
+                <a:solidFill>
+                  <a:srgbClr val="FFC000"/>
+                </a:solidFill>
+                <a:latin typeface="Agave"/>
+                <a:ea typeface="Agave"/>
+                <a:cs typeface="Agave"/>
+              </a:rPr>
+              <a:t>sitteth in the seat of the scornful</a:t>
+            </a:r>
+            <a:r>
+              <a:rPr lang="en-US" sz="4200" b="0" i="0" u="none" strike="noStrike" cap="none" spc="0">
+                <a:solidFill>
+                  <a:schemeClr val="bg1"/>
+                </a:solidFill>
+                <a:latin typeface="Agave"/>
+                <a:ea typeface="Agave"/>
+                <a:cs typeface="Agave"/>
+              </a:rPr>
+              <a:t>.</a:t>
+            </a:r>
+            <a:endParaRPr sz="4200" b="0" i="0" u="none" strike="noStrike" cap="none" spc="0">
+              <a:solidFill>
+                <a:schemeClr val="bg1"/>
+              </a:solidFill>
+              <a:latin typeface="Agave"/>
+              <a:ea typeface="Agave"/>
+              <a:cs typeface="Agave"/>
+            </a:endParaRPr>
+          </a:p>
+          <a:p>
+            <a:pPr>
+              <a:defRPr/>
+            </a:pPr>
+            <a:endParaRPr sz="4200" b="0" i="0" u="none" strike="noStrike" cap="none" spc="0">
+              <a:solidFill>
+                <a:schemeClr val="bg1"/>
+              </a:solidFill>
+              <a:latin typeface="Agave"/>
+              <a:cs typeface="Agave"/>
+            </a:endParaRPr>
+          </a:p>
+          <a:p>
+            <a:pPr>
+              <a:defRPr/>
+            </a:pPr>
+            <a:r>
+              <a:rPr lang="en-US" sz="4200" b="0" i="0" u="none" strike="noStrike" cap="none" spc="0">
+                <a:solidFill>
+                  <a:schemeClr val="bg1"/>
+                </a:solidFill>
+                <a:latin typeface="Agave"/>
+                <a:ea typeface="Agave"/>
+                <a:cs typeface="Agave"/>
+              </a:rPr>
+              <a:t>But </a:t>
+            </a:r>
+            <a:r>
+              <a:rPr lang="en-US" sz="4200" b="0" i="0" u="none" strike="noStrike" cap="none" spc="0">
+                <a:solidFill>
+                  <a:srgbClr val="00B0F0"/>
+                </a:solidFill>
+                <a:latin typeface="Agave"/>
+                <a:ea typeface="Agave"/>
+                <a:cs typeface="Agave"/>
+              </a:rPr>
+              <a:t>his delight</a:t>
+            </a:r>
+            <a:r>
+              <a:rPr lang="en-US" sz="4200" b="0" i="0" u="none" strike="noStrike" cap="none" spc="0">
+                <a:solidFill>
+                  <a:schemeClr val="bg1"/>
+                </a:solidFill>
+                <a:latin typeface="Agave"/>
+                <a:ea typeface="Agave"/>
+                <a:cs typeface="Agave"/>
+              </a:rPr>
+              <a:t> [is] in the </a:t>
+            </a:r>
+            <a:r>
+              <a:rPr lang="en-US" sz="4200" b="0" i="0" u="none" strike="noStrike" cap="none" spc="0">
                 <a:solidFill>
                   <a:srgbClr val="92D050"/>
                 </a:solidFill>
@@ -3781,10 +3905,21 @@
                 <a:ea typeface="Agave"/>
                 <a:cs typeface="Agave"/>
               </a:rPr>
-              <a:t>whose mind is </a:t>
-            </a:r>
-            <a:r>
-              <a:rPr lang="en-US" sz="4800" b="1" i="0" u="none" strike="noStrike" cap="none" spc="0">
+              <a:t>law of the LORD</a:t>
+            </a:r>
+            <a:r>
+              <a:rPr lang="en-US" sz="4200" b="0" i="0" u="none" strike="noStrike" cap="none" spc="0">
+                <a:solidFill>
+                  <a:schemeClr val="bg1"/>
+                </a:solidFill>
+                <a:latin typeface="Agave"/>
+                <a:ea typeface="Agave"/>
+                <a:cs typeface="Agave"/>
+              </a:rPr>
+              <a:t>; and </a:t>
+            </a:r>
+            <a:r>
+              <a:rPr lang="en-US" sz="4200" b="0" i="0" u="none" strike="noStrike" cap="none" spc="0">
                 <a:solidFill>
                   <a:srgbClr val="92D050"/>
                 </a:solidFill>
@@ -3792,10 +3927,10 @@
                 <a:ea typeface="Agave"/>
                 <a:cs typeface="Agave"/>
               </a:rPr>
-              <a:t>stayed on thee:</a:t>
-            </a:r>
-            <a:r>
-              <a:rPr lang="en-US" sz="4800" b="1" i="0" u="none" strike="noStrike" cap="none" spc="0">
+              <a:t>in</a:t>
+            </a:r>
+            <a:r>
+              <a:rPr lang="en-US" sz="4200" b="0" i="0" u="none" strike="noStrike" cap="none" spc="0">
                 <a:solidFill>
                   <a:schemeClr val="bg1"/>
                 </a:solidFill>
@@ -3806,42 +3941,18 @@
               <a:t> </a:t>
             </a:r>
             <a:r>
-              <a:rPr lang="en-US" sz="4800" b="1" i="0" u="none" strike="noStrike" cap="none" spc="0">
+              <a:rPr lang="en-US" sz="4200" b="0" i="0" u="none" strike="noStrike" cap="none" spc="0">
                 <a:solidFill>
-                  <a:srgbClr val="00B0F0"/>
+                  <a:srgbClr val="92D050"/>
                 </a:solidFill>
                 <a:latin typeface="Agave"/>
                 <a:ea typeface="Agave"/>
                 <a:cs typeface="Agave"/>
               </a:rPr>
-              <a:t>because he trusteth in Thee.</a:t>
-            </a:r>
-            <a:endParaRPr sz="4800" b="1" i="0" u="none" strike="noStrike" cap="none" spc="0">
-              <a:solidFill>
-                <a:srgbClr val="00B0F0"/>
-              </a:solidFill>
-              <a:latin typeface="Agave"/>
-              <a:cs typeface="Agave"/>
-            </a:endParaRPr>
-          </a:p>
-          <a:p>
-            <a:pPr>
-              <a:defRPr/>
-            </a:pPr>
-            <a:endParaRPr sz="4800" b="1" i="0" u="none" strike="noStrike" cap="none" spc="0">
-              <a:solidFill>
-                <a:schemeClr val="bg1"/>
-              </a:solidFill>
-              <a:latin typeface="Agave"/>
-              <a:cs typeface="Agave"/>
-            </a:endParaRPr>
-          </a:p>
-          <a:p>
-            <a:pPr>
-              <a:defRPr/>
-            </a:pPr>
-            <a:r>
-              <a:rPr lang="en-US" sz="4800" b="0" i="0" u="none" strike="noStrike" cap="none" spc="0">
+              <a:t>His law doth he meditate day and night</a:t>
+            </a:r>
+            <a:r>
+              <a:rPr lang="en-US" sz="4200" b="0" i="0" u="none" strike="noStrike" cap="none" spc="0">
                 <a:solidFill>
                   <a:schemeClr val="bg1"/>
                 </a:solidFill>
@@ -3849,54 +3960,9 @@
                 <a:ea typeface="Agave"/>
                 <a:cs typeface="Agave"/>
               </a:rPr>
-              <a:t>Trust ye in the LORD for ever: </a:t>
-            </a:r>
-            <a:r>
-              <a:rPr lang="en-US" sz="4800" b="1" i="0" u="none" strike="noStrike" cap="none" spc="0">
-                <a:solidFill>
-                  <a:srgbClr val="FFC000"/>
-                </a:solidFill>
-                <a:latin typeface="Agave"/>
-                <a:ea typeface="Agave"/>
-                <a:cs typeface="Agave"/>
-              </a:rPr>
-              <a:t>for in the LORD </a:t>
-            </a:r>
-            <a:r>
-              <a:rPr lang="en-US" sz="4800" b="1" i="0" u="none" strike="noStrike" cap="none" spc="0">
-                <a:solidFill>
-                  <a:srgbClr val="FFC000"/>
-                </a:solidFill>
-                <a:latin typeface="Agave"/>
-                <a:ea typeface="Agave"/>
-                <a:cs typeface="Agave"/>
-              </a:rPr>
-              <a:t>Jehova</a:t>
-            </a:r>
-            <a:r>
-              <a:rPr lang="en-US" sz="4800" b="1" i="0" u="none" strike="noStrike" cap="none" spc="0">
-                <a:solidFill>
-                  <a:srgbClr val="FFC000"/>
-                </a:solidFill>
-                <a:latin typeface="Agave"/>
-                <a:ea typeface="Agave"/>
-                <a:cs typeface="Agave"/>
-              </a:rPr>
-              <a:t>h is everlasting strength</a:t>
-            </a:r>
-            <a:endParaRPr sz="7200" b="1" i="0" u="none" strike="noStrike" cap="none" spc="0">
-              <a:solidFill>
-                <a:srgbClr val="EA9A97"/>
-              </a:solidFill>
-              <a:latin typeface="Agave"/>
-              <a:cs typeface="Agave"/>
-            </a:endParaRPr>
-          </a:p>
-          <a:p>
-            <a:pPr>
-              <a:defRPr/>
-            </a:pPr>
-            <a:endParaRPr sz="3600" b="0" i="1" u="none" strike="noStrike" cap="none" spc="0">
+              <a:t>.</a:t>
+            </a:r>
+            <a:endParaRPr sz="4600" b="1" i="0" u="none" strike="noStrike" cap="none" spc="0">
               <a:solidFill>
                 <a:schemeClr val="bg1"/>
               </a:solidFill>
@@ -3908,8 +3974,20 @@
             <a:pPr>
               <a:defRPr/>
             </a:pPr>
-            <a:r>
-              <a:rPr sz="3600" b="0" i="1" u="none" strike="noStrike" cap="none" spc="0">
+            <a:endParaRPr sz="4600" b="0" i="1" u="none" strike="noStrike" cap="none" spc="0">
+              <a:solidFill>
+                <a:schemeClr val="bg1"/>
+              </a:solidFill>
+              <a:latin typeface="Agave"/>
+              <a:cs typeface="Agave"/>
+            </a:endParaRPr>
+          </a:p>
+          <a:p>
+            <a:pPr>
+              <a:defRPr/>
+            </a:pPr>
+            <a:r>
+              <a:rPr sz="4600" b="0" i="1" u="none" strike="noStrike" cap="none" spc="0">
                 <a:solidFill>
                   <a:schemeClr val="bg1"/>
                 </a:solidFill>
@@ -3917,13 +3995,11 @@
                 <a:ea typeface="Agave"/>
                 <a:cs typeface="Agave"/>
               </a:rPr>
-              <a:t>Isaiah 26:3,4</a:t>
-            </a:r>
-            <a:endParaRPr sz="2800" b="0" i="1" u="none" strike="noStrike" cap="none" spc="0">
+              <a:t>Psalm 1:1,2</a:t>
+            </a:r>
+            <a:endParaRPr sz="4600" b="0" i="1" u="none" strike="noStrike" cap="none" spc="0">
               <a:solidFill>
-                <a:schemeClr val="bg1">
-                  <a:lumMod val="75000"/>
-                </a:schemeClr>
+                <a:schemeClr val="bg1"/>
               </a:solidFill>
               <a:latin typeface="Agave"/>
               <a:ea typeface="Agave"/>
@@ -3934,7 +4010,7 @@
             <a:pPr>
               <a:defRPr/>
             </a:pPr>
-            <a:endParaRPr lang="en-US" sz="3600" b="0" i="1" u="none" strike="noStrike" cap="none" spc="0">
+            <a:endParaRPr sz="4600" b="0" i="1" u="none" strike="noStrike" cap="none" spc="0">
               <a:solidFill>
                 <a:schemeClr val="bg1"/>
               </a:solidFill>
@@ -4003,7 +4079,7 @@
         <p:spPr bwMode="auto">
           <a:xfrm flipH="0" flipV="0">
             <a:off x="13610" y="9578862"/>
-            <a:ext cx="10247580" cy="75539"/>
+            <a:ext cx="10247579" cy="75539"/>
           </a:xfrm>
           <a:prstGeom prst="line">
             <a:avLst/>
@@ -4032,54 +4108,6 @@
           </a:fontRef>
         </p:style>
       </p:cxnSp>
-      <p:sp>
-        <p:nvSpPr>
-          <p:cNvPr id="1215686788" name="TextBox 6"/>
-          <p:cNvSpPr txBox="1"/>
-          <p:nvPr/>
-        </p:nvSpPr>
-        <p:spPr bwMode="auto">
-          <a:xfrm rot="0" flipH="0" flipV="0">
-            <a:off x="173054" y="9377741"/>
-            <a:ext cx="4594243" cy="782042"/>
-          </a:xfrm>
-          <a:prstGeom prst="rect">
-            <a:avLst/>
-          </a:prstGeom>
-        </p:spPr>
-        <p:txBody>
-          <a:bodyPr lIns="0" tIns="0" rIns="0" bIns="0" rtlCol="0" anchor="t">
-            <a:spAutoFit/>
-          </a:bodyPr>
-          <a:lstStyle/>
-          <a:p>
-            <a:pPr algn="ctr">
-              <a:lnSpc>
-                <a:spcPts val="6153"/>
-              </a:lnSpc>
-              <a:defRPr/>
-            </a:pPr>
-            <a:r>
-              <a:rPr lang="en-US" sz="2600" b="0">
-                <a:solidFill>
-                  <a:schemeClr val="bg1"/>
-                </a:solidFill>
-                <a:latin typeface="Agave"/>
-                <a:ea typeface="Agave"/>
-                <a:cs typeface="Agave"/>
-              </a:rPr>
-              <a:t>The Health Message Works!</a:t>
-            </a:r>
-            <a:endParaRPr sz="2600" b="0">
-              <a:solidFill>
-                <a:schemeClr val="bg1"/>
-              </a:solidFill>
-              <a:latin typeface="Tinos"/>
-              <a:cs typeface="Tinos"/>
-            </a:endParaRPr>
-          </a:p>
-        </p:txBody>
-      </p:sp>
       <p:sp>
         <p:nvSpPr>
           <p:cNvPr id="1341912963" name=""/>

</xml_diff>